<commit_message>
Added Hands On Demos - Day 19
</commit_message>
<xml_diff>
--- a/5. Angular 11/Day 18/Slides/6. Data Binding & Pipes/data-binding-and-pipes-slides.pptx
+++ b/5. Angular 11/Day 18/Slides/6. Data Binding & Pipes/data-binding-and-pipes-slides.pptx
@@ -26840,54 +26840,6 @@
               <a:cs typeface="Courier New" panose="02070309020205020404"/>
             </a:endParaRPr>
           </a:p>
-        </p:txBody>
-      </p:sp>
-      <p:sp>
-        <p:nvSpPr>
-          <p:cNvPr id="8" name="object 8"/>
-          <p:cNvSpPr/>
-          <p:nvPr/>
-        </p:nvSpPr>
-        <p:spPr>
-          <a:xfrm>
-            <a:off x="9997095" y="4572000"/>
-            <a:ext cx="6627495" cy="571500"/>
-          </a:xfrm>
-          <a:custGeom>
-            <a:avLst/>
-            <a:gdLst/>
-            <a:ahLst/>
-            <a:cxnLst/>
-            <a:rect l="l" t="t" r="r" b="b"/>
-            <a:pathLst>
-              <a:path w="6627494" h="571500">
-                <a:moveTo>
-                  <a:pt x="6627420" y="0"/>
-                </a:moveTo>
-                <a:lnTo>
-                  <a:pt x="0" y="0"/>
-                </a:lnTo>
-                <a:lnTo>
-                  <a:pt x="0" y="571500"/>
-                </a:lnTo>
-                <a:lnTo>
-                  <a:pt x="6627420" y="571500"/>
-                </a:lnTo>
-                <a:lnTo>
-                  <a:pt x="6627420" y="0"/>
-                </a:lnTo>
-                <a:close/>
-              </a:path>
-            </a:pathLst>
-          </a:custGeom>
-          <a:solidFill>
-            <a:srgbClr val="FFFFFF"/>
-          </a:solidFill>
-        </p:spPr>
-        <p:txBody>
-          <a:bodyPr wrap="square" lIns="0" tIns="0" rIns="0" bIns="0" rtlCol="0"/>
-          <a:lstStyle/>
-          <a:p/>
         </p:txBody>
       </p:sp>
       <p:grpSp>

</xml_diff>